<commit_message>
Deploying to gh-pages from master @ a0dca283bd7196e5a8dcb39d6c880c23245f7112 🚀
</commit_message>
<xml_diff>
--- a/websitepopup/Phishing.pptx
+++ b/websitepopup/Phishing.pptx
@@ -2,7 +2,7 @@
 <file path=ppt/presentation.xml><?xml version="1.0" encoding="utf-8"?>
 <p:presentation xmlns:a="http://schemas.openxmlformats.org/drawingml/2006/main" xmlns:r="http://schemas.openxmlformats.org/officeDocument/2006/relationships" xmlns:p="http://schemas.openxmlformats.org/presentationml/2006/main" saveSubsetFonts="1" autoCompressPictures="0">
   <p:sldMasterIdLst>
-    <p:sldMasterId id="2147483696" r:id="rId1"/>
+    <p:sldMasterId id="2147483660" r:id="rId1"/>
   </p:sldMasterIdLst>
   <p:sldIdLst>
     <p:sldId id="256" r:id="rId2"/>
@@ -266,7 +266,7 @@
           <a:p>
             <a:fld id="{5BCAD085-E8A6-8845-BD4E-CB4CCA059FC4}" type="datetimeFigureOut">
               <a:rPr lang="en-US" smtClean="0"/>
-              <a:t>9/26/2025</a:t>
+              <a:t>9/29/2025</a:t>
             </a:fld>
             <a:endParaRPr lang="en-US"/>
           </a:p>
@@ -358,7 +358,7 @@
     </p:spTree>
     <p:extLst>
       <p:ext uri="{BB962C8B-B14F-4D97-AF65-F5344CB8AC3E}">
-        <p14:creationId xmlns:p14="http://schemas.microsoft.com/office/powerpoint/2010/main" val="807197543"/>
+        <p14:creationId xmlns:p14="http://schemas.microsoft.com/office/powerpoint/2010/main" val="2425169550"/>
       </p:ext>
     </p:extLst>
   </p:cSld>
@@ -508,7 +508,7 @@
           <a:p>
             <a:fld id="{5BCAD085-E8A6-8845-BD4E-CB4CCA059FC4}" type="datetimeFigureOut">
               <a:rPr lang="en-US" smtClean="0"/>
-              <a:t>9/26/2025</a:t>
+              <a:t>9/29/2025</a:t>
             </a:fld>
             <a:endParaRPr lang="en-US"/>
           </a:p>
@@ -559,7 +559,7 @@
     </p:spTree>
     <p:extLst>
       <p:ext uri="{BB962C8B-B14F-4D97-AF65-F5344CB8AC3E}">
-        <p14:creationId xmlns:p14="http://schemas.microsoft.com/office/powerpoint/2010/main" val="2853556557"/>
+        <p14:creationId xmlns:p14="http://schemas.microsoft.com/office/powerpoint/2010/main" val="2999774020"/>
       </p:ext>
     </p:extLst>
   </p:cSld>
@@ -692,7 +692,7 @@
           <a:p>
             <a:fld id="{5BCAD085-E8A6-8845-BD4E-CB4CCA059FC4}" type="datetimeFigureOut">
               <a:rPr lang="en-US" smtClean="0"/>
-              <a:t>9/26/2025</a:t>
+              <a:t>9/29/2025</a:t>
             </a:fld>
             <a:endParaRPr lang="en-US"/>
           </a:p>
@@ -774,7 +774,7 @@
     </p:spTree>
     <p:extLst>
       <p:ext uri="{BB962C8B-B14F-4D97-AF65-F5344CB8AC3E}">
-        <p14:creationId xmlns:p14="http://schemas.microsoft.com/office/powerpoint/2010/main" val="2089508149"/>
+        <p14:creationId xmlns:p14="http://schemas.microsoft.com/office/powerpoint/2010/main" val="3850362994"/>
       </p:ext>
     </p:extLst>
   </p:cSld>
@@ -893,7 +893,7 @@
           <a:p>
             <a:fld id="{5BCAD085-E8A6-8845-BD4E-CB4CCA059FC4}" type="datetimeFigureOut">
               <a:rPr lang="en-US" smtClean="0"/>
-              <a:t>9/26/2025</a:t>
+              <a:t>9/29/2025</a:t>
             </a:fld>
             <a:endParaRPr lang="en-US"/>
           </a:p>
@@ -975,7 +975,7 @@
     </p:spTree>
     <p:extLst>
       <p:ext uri="{BB962C8B-B14F-4D97-AF65-F5344CB8AC3E}">
-        <p14:creationId xmlns:p14="http://schemas.microsoft.com/office/powerpoint/2010/main" val="4218163895"/>
+        <p14:creationId xmlns:p14="http://schemas.microsoft.com/office/powerpoint/2010/main" val="10017057"/>
       </p:ext>
     </p:extLst>
   </p:cSld>
@@ -1172,7 +1172,7 @@
           <a:p>
             <a:fld id="{5BCAD085-E8A6-8845-BD4E-CB4CCA059FC4}" type="datetimeFigureOut">
               <a:rPr lang="en-US" smtClean="0"/>
-              <a:t>9/26/2025</a:t>
+              <a:t>9/29/2025</a:t>
             </a:fld>
             <a:endParaRPr lang="en-US"/>
           </a:p>
@@ -1254,7 +1254,7 @@
     </p:spTree>
     <p:extLst>
       <p:ext uri="{BB962C8B-B14F-4D97-AF65-F5344CB8AC3E}">
-        <p14:creationId xmlns:p14="http://schemas.microsoft.com/office/powerpoint/2010/main" val="1062874799"/>
+        <p14:creationId xmlns:p14="http://schemas.microsoft.com/office/powerpoint/2010/main" val="1209459503"/>
       </p:ext>
     </p:extLst>
   </p:cSld>
@@ -1440,7 +1440,7 @@
           <a:p>
             <a:fld id="{5BCAD085-E8A6-8845-BD4E-CB4CCA059FC4}" type="datetimeFigureOut">
               <a:rPr lang="en-US" smtClean="0"/>
-              <a:t>9/26/2025</a:t>
+              <a:t>9/29/2025</a:t>
             </a:fld>
             <a:endParaRPr lang="en-US"/>
           </a:p>
@@ -1522,7 +1522,7 @@
     </p:spTree>
     <p:extLst>
       <p:ext uri="{BB962C8B-B14F-4D97-AF65-F5344CB8AC3E}">
-        <p14:creationId xmlns:p14="http://schemas.microsoft.com/office/powerpoint/2010/main" val="2948991840"/>
+        <p14:creationId xmlns:p14="http://schemas.microsoft.com/office/powerpoint/2010/main" val="3878098889"/>
       </p:ext>
     </p:extLst>
   </p:cSld>
@@ -1887,7 +1887,7 @@
           <a:p>
             <a:fld id="{5BCAD085-E8A6-8845-BD4E-CB4CCA059FC4}" type="datetimeFigureOut">
               <a:rPr lang="en-US" smtClean="0"/>
-              <a:t>9/26/2025</a:t>
+              <a:t>9/29/2025</a:t>
             </a:fld>
             <a:endParaRPr lang="en-US"/>
           </a:p>
@@ -1938,7 +1938,7 @@
     </p:spTree>
     <p:extLst>
       <p:ext uri="{BB962C8B-B14F-4D97-AF65-F5344CB8AC3E}">
-        <p14:creationId xmlns:p14="http://schemas.microsoft.com/office/powerpoint/2010/main" val="3082928722"/>
+        <p14:creationId xmlns:p14="http://schemas.microsoft.com/office/powerpoint/2010/main" val="1752374503"/>
       </p:ext>
     </p:extLst>
   </p:cSld>
@@ -2036,7 +2036,7 @@
           <a:p>
             <a:fld id="{5BCAD085-E8A6-8845-BD4E-CB4CCA059FC4}" type="datetimeFigureOut">
               <a:rPr lang="en-US" smtClean="0"/>
-              <a:t>9/26/2025</a:t>
+              <a:t>9/29/2025</a:t>
             </a:fld>
             <a:endParaRPr lang="en-US"/>
           </a:p>
@@ -2087,7 +2087,7 @@
     </p:spTree>
     <p:extLst>
       <p:ext uri="{BB962C8B-B14F-4D97-AF65-F5344CB8AC3E}">
-        <p14:creationId xmlns:p14="http://schemas.microsoft.com/office/powerpoint/2010/main" val="1742647191"/>
+        <p14:creationId xmlns:p14="http://schemas.microsoft.com/office/powerpoint/2010/main" val="2843665889"/>
       </p:ext>
     </p:extLst>
   </p:cSld>
@@ -2131,7 +2131,7 @@
           <a:p>
             <a:fld id="{5BCAD085-E8A6-8845-BD4E-CB4CCA059FC4}" type="datetimeFigureOut">
               <a:rPr lang="en-US" smtClean="0"/>
-              <a:t>9/26/2025</a:t>
+              <a:t>9/29/2025</a:t>
             </a:fld>
             <a:endParaRPr lang="en-US"/>
           </a:p>
@@ -2182,7 +2182,7 @@
     </p:spTree>
     <p:extLst>
       <p:ext uri="{BB962C8B-B14F-4D97-AF65-F5344CB8AC3E}">
-        <p14:creationId xmlns:p14="http://schemas.microsoft.com/office/powerpoint/2010/main" val="956296218"/>
+        <p14:creationId xmlns:p14="http://schemas.microsoft.com/office/powerpoint/2010/main" val="1804626600"/>
       </p:ext>
     </p:extLst>
   </p:cSld>
@@ -2384,7 +2384,7 @@
           <a:p>
             <a:fld id="{5BCAD085-E8A6-8845-BD4E-CB4CCA059FC4}" type="datetimeFigureOut">
               <a:rPr lang="en-US" smtClean="0"/>
-              <a:t>9/26/2025</a:t>
+              <a:t>9/29/2025</a:t>
             </a:fld>
             <a:endParaRPr lang="en-US"/>
           </a:p>
@@ -2466,7 +2466,7 @@
     </p:spTree>
     <p:extLst>
       <p:ext uri="{BB962C8B-B14F-4D97-AF65-F5344CB8AC3E}">
-        <p14:creationId xmlns:p14="http://schemas.microsoft.com/office/powerpoint/2010/main" val="794717645"/>
+        <p14:creationId xmlns:p14="http://schemas.microsoft.com/office/powerpoint/2010/main" val="3928982907"/>
       </p:ext>
     </p:extLst>
   </p:cSld>
@@ -2829,7 +2829,7 @@
           <a:p>
             <a:fld id="{5BCAD085-E8A6-8845-BD4E-CB4CCA059FC4}" type="datetimeFigureOut">
               <a:rPr lang="en-US" smtClean="0"/>
-              <a:t>9/26/2025</a:t>
+              <a:t>9/29/2025</a:t>
             </a:fld>
             <a:endParaRPr lang="en-US"/>
           </a:p>
@@ -2916,7 +2916,7 @@
     </p:spTree>
     <p:extLst>
       <p:ext uri="{BB962C8B-B14F-4D97-AF65-F5344CB8AC3E}">
-        <p14:creationId xmlns:p14="http://schemas.microsoft.com/office/powerpoint/2010/main" val="2816729844"/>
+        <p14:creationId xmlns:p14="http://schemas.microsoft.com/office/powerpoint/2010/main" val="486463360"/>
       </p:ext>
     </p:extLst>
   </p:cSld>
@@ -3193,7 +3193,7 @@
           <a:p>
             <a:fld id="{5BCAD085-E8A6-8845-BD4E-CB4CCA059FC4}" type="datetimeFigureOut">
               <a:rPr lang="en-US" smtClean="0"/>
-              <a:t>9/26/2025</a:t>
+              <a:t>9/29/2025</a:t>
             </a:fld>
             <a:endParaRPr lang="en-US"/>
           </a:p>
@@ -3278,23 +3278,23 @@
     </p:spTree>
     <p:extLst>
       <p:ext uri="{BB962C8B-B14F-4D97-AF65-F5344CB8AC3E}">
-        <p14:creationId xmlns:p14="http://schemas.microsoft.com/office/powerpoint/2010/main" val="3059913128"/>
+        <p14:creationId xmlns:p14="http://schemas.microsoft.com/office/powerpoint/2010/main" val="1650146979"/>
       </p:ext>
     </p:extLst>
   </p:cSld>
   <p:clrMap bg1="lt1" tx1="dk1" bg2="lt2" tx2="dk2" accent1="accent1" accent2="accent2" accent3="accent3" accent4="accent4" accent5="accent5" accent6="accent6" hlink="hlink" folHlink="folHlink"/>
   <p:sldLayoutIdLst>
-    <p:sldLayoutId id="2147483697" r:id="rId1"/>
-    <p:sldLayoutId id="2147483698" r:id="rId2"/>
-    <p:sldLayoutId id="2147483699" r:id="rId3"/>
-    <p:sldLayoutId id="2147483700" r:id="rId4"/>
-    <p:sldLayoutId id="2147483701" r:id="rId5"/>
-    <p:sldLayoutId id="2147483702" r:id="rId6"/>
-    <p:sldLayoutId id="2147483703" r:id="rId7"/>
-    <p:sldLayoutId id="2147483704" r:id="rId8"/>
-    <p:sldLayoutId id="2147483705" r:id="rId9"/>
-    <p:sldLayoutId id="2147483706" r:id="rId10"/>
-    <p:sldLayoutId id="2147483707" r:id="rId11"/>
+    <p:sldLayoutId id="2147483661" r:id="rId1"/>
+    <p:sldLayoutId id="2147483662" r:id="rId2"/>
+    <p:sldLayoutId id="2147483663" r:id="rId3"/>
+    <p:sldLayoutId id="2147483664" r:id="rId4"/>
+    <p:sldLayoutId id="2147483665" r:id="rId5"/>
+    <p:sldLayoutId id="2147483666" r:id="rId6"/>
+    <p:sldLayoutId id="2147483667" r:id="rId7"/>
+    <p:sldLayoutId id="2147483668" r:id="rId8"/>
+    <p:sldLayoutId id="2147483669" r:id="rId9"/>
+    <p:sldLayoutId id="2147483670" r:id="rId10"/>
+    <p:sldLayoutId id="2147483671" r:id="rId11"/>
   </p:sldLayoutIdLst>
   <p:txStyles>
     <p:titleStyle>
@@ -3658,7 +3658,7 @@
           <a:lstStyle/>
           <a:p>
             <a:r>
-              <a:t>Phishing: Stay Safe Online</a:t>
+              <a:t>Phishing Awareness</a:t>
             </a:r>
           </a:p>
         </p:txBody>
@@ -3679,12 +3679,7 @@
           <a:lstStyle/>
           <a:p>
             <a:r>
-              <a:t>Simple tips to spot and avoid phishing</a:t>
-            </a:r>
-          </a:p>
-          <a:p>
-            <a:r>
-              <a:t>(5-slide quick guide)</a:t>
+              <a:t>Cyber Rangers Training – ICT302 Project</a:t>
             </a:r>
           </a:p>
         </p:txBody>
@@ -3730,7 +3725,7 @@
           <a:lstStyle/>
           <a:p>
             <a:r>
-              <a:t>What is phishing?</a:t>
+              <a:t>What is Phishing?</a:t>
             </a:r>
           </a:p>
         </p:txBody>
@@ -3750,29 +3745,43 @@
           <a:bodyPr/>
           <a:lstStyle/>
           <a:p>
-            <a:pPr>
-              <a:defRPr sz="1800"/>
-            </a:pPr>
             <a:r>
               <a:rPr dirty="0"/>
-              <a:t>A scam that tricks you into giving personal info (passwords, card</a:t>
-            </a:r>
-            <a:r>
-              <a:rPr lang="en-US" dirty="0"/>
-              <a:t> details</a:t>
-            </a:r>
+              <a:t>Cybercrime tricking you into revealing sensitive info</a:t>
+            </a:r>
+          </a:p>
+          <a:p>
             <a:r>
               <a:rPr dirty="0"/>
-              <a:t>).</a:t>
-            </a:r>
-          </a:p>
-          <a:p>
-            <a:pPr>
-              <a:defRPr sz="1800"/>
-            </a:pPr>
+              <a:t>Usually comes through:</a:t>
+            </a:r>
+            <a:endParaRPr lang="en-US" dirty="0"/>
+          </a:p>
+          <a:p>
+            <a:pPr lvl="1"/>
             <a:r>
               <a:rPr dirty="0"/>
-              <a:t>Usually uses fake emails, messages or websites pretending to be real.</a:t>
+              <a:t>Emails (fake invoices, overdue notices)</a:t>
+            </a:r>
+          </a:p>
+          <a:p>
+            <a:pPr lvl="1"/>
+            <a:r>
+              <a:rPr dirty="0"/>
+              <a:t>SMS messages (fake bank/OTP requests)</a:t>
+            </a:r>
+          </a:p>
+          <a:p>
+            <a:pPr lvl="1"/>
+            <a:r>
+              <a:rPr dirty="0"/>
+              <a:t>QR codes (leading to malicious websites)</a:t>
+            </a:r>
+          </a:p>
+          <a:p>
+            <a:r>
+              <a:rPr dirty="0"/>
+              <a:t>Goal: steal passwords, money, or personal data</a:t>
             </a:r>
           </a:p>
         </p:txBody>
@@ -3818,7 +3827,7 @@
           <a:lstStyle/>
           <a:p>
             <a:r>
-              <a:t>Common phishing types</a:t>
+              <a:t>Real Examples in Our Game</a:t>
             </a:r>
           </a:p>
         </p:txBody>
@@ -3838,46 +3847,75 @@
           <a:bodyPr/>
           <a:lstStyle/>
           <a:p>
-            <a:pPr>
-              <a:defRPr sz="1800"/>
+            <a:r>
+              <a:rPr dirty="0"/>
+              <a:t>SMS Phishing – 'Click this link to verify your account'</a:t>
+            </a:r>
+          </a:p>
+          <a:p>
+            <a:r>
+              <a:rPr dirty="0"/>
+              <a:t>QR Code Phishing – scan leads to fake login page</a:t>
+            </a:r>
+          </a:p>
+          <a:p>
+            <a:r>
+              <a:rPr dirty="0"/>
+              <a:t>Email Phishing – fake Murdoch University payment notice</a:t>
+            </a:r>
+          </a:p>
+          <a:p>
+            <a:pPr marL="0" indent="0">
+              <a:buNone/>
             </a:pPr>
+            <a:endParaRPr lang="en-US" dirty="0"/>
+          </a:p>
+          <a:p>
+            <a:pPr marL="0" indent="0">
+              <a:buNone/>
+            </a:pPr>
             <a:r>
               <a:rPr dirty="0"/>
-              <a:t>Email phishing: fake emails asking to click a link or login.</a:t>
-            </a:r>
-          </a:p>
-          <a:p>
-            <a:pPr>
-              <a:defRPr sz="1800"/>
+              <a:t>(These are the Easter eggs in your Library storyline</a:t>
+            </a:r>
+            <a:r>
+              <a:rPr lang="en-US" dirty="0"/>
+              <a:t>)</a:t>
+            </a:r>
+          </a:p>
+          <a:p>
+            <a:pPr marL="0" indent="0">
+              <a:buNone/>
             </a:pPr>
             <a:r>
-              <a:rPr dirty="0"/>
-              <a:t>Spear phishing: targeted messages that seem personal.</a:t>
-            </a:r>
-          </a:p>
-          <a:p>
-            <a:pPr>
-              <a:defRPr sz="1800"/>
-            </a:pPr>
-            <a:r>
-              <a:rPr dirty="0"/>
-              <a:t>Smishing &amp; vishing: SMS or phone-call based scams.</a:t>
-            </a:r>
-            <a:endParaRPr lang="en-US" dirty="0"/>
-          </a:p>
-          <a:p>
-            <a:pPr>
-              <a:defRPr sz="1800"/>
-            </a:pPr>
-            <a:r>
-              <a:rPr lang="en-SG" dirty="0" err="1"/>
-              <a:t>Quishing</a:t>
-            </a:r>
-            <a:r>
-              <a:rPr lang="en-SG" dirty="0"/>
-              <a:t>: phishing through the use of QR codes</a:t>
-            </a:r>
-            <a:endParaRPr dirty="0"/>
+              <a:rPr lang="en-US" dirty="0">
+                <a:solidFill>
+                  <a:srgbClr val="FF0000"/>
+                </a:solidFill>
+              </a:rPr>
+              <a:t>Find ‘</a:t>
+            </a:r>
+            <a:r>
+              <a:rPr lang="en-US" dirty="0" err="1">
+                <a:solidFill>
+                  <a:srgbClr val="FF0000"/>
+                </a:solidFill>
+              </a:rPr>
+              <a:t>em</a:t>
+            </a:r>
+            <a:r>
+              <a:rPr lang="en-US" dirty="0">
+                <a:solidFill>
+                  <a:srgbClr val="FF0000"/>
+                </a:solidFill>
+              </a:rPr>
+              <a:t> all!</a:t>
+            </a:r>
+            <a:endParaRPr dirty="0">
+              <a:solidFill>
+                <a:srgbClr val="FF0000"/>
+              </a:solidFill>
+            </a:endParaRPr>
           </a:p>
         </p:txBody>
       </p:sp>
@@ -3922,7 +3960,7 @@
           <a:lstStyle/>
           <a:p>
             <a:r>
-              <a:t>How to spot phishing</a:t>
+              <a:t>How to Spot Phishing</a:t>
             </a:r>
           </a:p>
         </p:txBody>
@@ -3942,39 +3980,28 @@
           <a:bodyPr/>
           <a:lstStyle/>
           <a:p>
-            <a:pPr>
-              <a:defRPr sz="1800"/>
-            </a:pPr>
-            <a:r>
-              <a:rPr dirty="0"/>
-              <a:t>Suspicious sender address or small spelling changes in domain.</a:t>
-            </a:r>
-          </a:p>
-          <a:p>
-            <a:pPr>
-              <a:defRPr sz="1800"/>
-            </a:pPr>
-            <a:r>
-              <a:rPr dirty="0"/>
-              <a:t>Urgent requests, threats, or 'verify now' messages.</a:t>
-            </a:r>
-          </a:p>
-          <a:p>
-            <a:pPr>
-              <a:defRPr sz="1800"/>
-            </a:pPr>
-            <a:r>
-              <a:rPr dirty="0"/>
-              <a:t>Links that don’t match the displayed text — hover to preview.</a:t>
-            </a:r>
-          </a:p>
-          <a:p>
-            <a:pPr>
-              <a:defRPr sz="1800"/>
-            </a:pPr>
-            <a:r>
-              <a:rPr dirty="0"/>
-              <a:t>Attachments you weren't expecting (.exe, .zip are risky).</a:t>
+            <a:r>
+              <a:t>✅ Check sender address and spelling</a:t>
+            </a:r>
+          </a:p>
+          <a:p>
+            <a:r>
+              <a:t>✅ Hover over links before clicking</a:t>
+            </a:r>
+          </a:p>
+          <a:p>
+            <a:r>
+              <a:t>✅ Don’t trust urgent 'Pay Now!' messages</a:t>
+            </a:r>
+          </a:p>
+          <a:p>
+            <a:r>
+              <a:t>✅ Avoid scanning random QR codes</a:t>
+            </a:r>
+          </a:p>
+          <a:p>
+            <a:r>
+              <a:t>✅ Verify with the real source (bank, university, etc.)</a:t>
             </a:r>
           </a:p>
         </p:txBody>
@@ -4020,7 +4047,7 @@
           <a:lstStyle/>
           <a:p>
             <a:r>
-              <a:t>Protect yourself — quick tips</a:t>
+              <a:t>Stay Safe Online</a:t>
             </a:r>
           </a:p>
         </p:txBody>
@@ -4040,52 +4067,27 @@
           <a:bodyPr/>
           <a:lstStyle/>
           <a:p>
-            <a:pPr>
-              <a:defRPr sz="1800"/>
-            </a:pPr>
             <a:r>
               <a:rPr dirty="0"/>
-              <a:t>Verify sender separately</a:t>
-            </a:r>
-            <a:endParaRPr lang="en-SG"/>
-          </a:p>
-          <a:p>
-            <a:pPr>
-              <a:defRPr sz="1800"/>
-            </a:pPr>
-            <a:r>
-              <a:t>Don't </a:t>
-            </a:r>
+              <a:t>Be skeptical, pause before clicking</a:t>
+            </a:r>
+          </a:p>
+          <a:p>
             <a:r>
               <a:rPr dirty="0"/>
-              <a:t>click links — go to the website directly</a:t>
-            </a:r>
-          </a:p>
-          <a:p>
-            <a:pPr>
-              <a:defRPr sz="1800"/>
-            </a:pPr>
+              <a:t>Report suspicious messages to IT/security team</a:t>
+            </a:r>
+          </a:p>
+          <a:p>
             <a:r>
               <a:rPr dirty="0"/>
-              <a:t>Enable 2FA on important accounts.</a:t>
-            </a:r>
-          </a:p>
-          <a:p>
-            <a:pPr>
-              <a:defRPr sz="1800"/>
-            </a:pPr>
+              <a:t>Always check the official website directly</a:t>
+            </a:r>
+          </a:p>
+          <a:p>
             <a:r>
               <a:rPr dirty="0"/>
-              <a:t>Keep software updated and use reputable antivirus.</a:t>
-            </a:r>
-          </a:p>
-          <a:p>
-            <a:pPr>
-              <a:defRPr sz="1800"/>
-            </a:pPr>
-            <a:r>
-              <a:rPr dirty="0"/>
-              <a:t>When unsure, report to IT or delete the message.</a:t>
+              <a:t>Remember: Think Before You Click!</a:t>
             </a:r>
           </a:p>
         </p:txBody>

</xml_diff>

<commit_message>
Deploying to gh-pages from master @ 6b8f290ab5f76a96d89860ae22104deee5a8b33a 🚀
</commit_message>
<xml_diff>
--- a/websitepopup/Phishing.pptx
+++ b/websitepopup/Phishing.pptx
@@ -266,7 +266,7 @@
           <a:p>
             <a:fld id="{5BCAD085-E8A6-8845-BD4E-CB4CCA059FC4}" type="datetimeFigureOut">
               <a:rPr lang="en-US" smtClean="0"/>
-              <a:t>9/29/2025</a:t>
+              <a:t>9/30/2025</a:t>
             </a:fld>
             <a:endParaRPr lang="en-US"/>
           </a:p>
@@ -508,7 +508,7 @@
           <a:p>
             <a:fld id="{5BCAD085-E8A6-8845-BD4E-CB4CCA059FC4}" type="datetimeFigureOut">
               <a:rPr lang="en-US" smtClean="0"/>
-              <a:t>9/29/2025</a:t>
+              <a:t>9/30/2025</a:t>
             </a:fld>
             <a:endParaRPr lang="en-US"/>
           </a:p>
@@ -692,7 +692,7 @@
           <a:p>
             <a:fld id="{5BCAD085-E8A6-8845-BD4E-CB4CCA059FC4}" type="datetimeFigureOut">
               <a:rPr lang="en-US" smtClean="0"/>
-              <a:t>9/29/2025</a:t>
+              <a:t>9/30/2025</a:t>
             </a:fld>
             <a:endParaRPr lang="en-US"/>
           </a:p>
@@ -893,7 +893,7 @@
           <a:p>
             <a:fld id="{5BCAD085-E8A6-8845-BD4E-CB4CCA059FC4}" type="datetimeFigureOut">
               <a:rPr lang="en-US" smtClean="0"/>
-              <a:t>9/29/2025</a:t>
+              <a:t>9/30/2025</a:t>
             </a:fld>
             <a:endParaRPr lang="en-US"/>
           </a:p>
@@ -1172,7 +1172,7 @@
           <a:p>
             <a:fld id="{5BCAD085-E8A6-8845-BD4E-CB4CCA059FC4}" type="datetimeFigureOut">
               <a:rPr lang="en-US" smtClean="0"/>
-              <a:t>9/29/2025</a:t>
+              <a:t>9/30/2025</a:t>
             </a:fld>
             <a:endParaRPr lang="en-US"/>
           </a:p>
@@ -1440,7 +1440,7 @@
           <a:p>
             <a:fld id="{5BCAD085-E8A6-8845-BD4E-CB4CCA059FC4}" type="datetimeFigureOut">
               <a:rPr lang="en-US" smtClean="0"/>
-              <a:t>9/29/2025</a:t>
+              <a:t>9/30/2025</a:t>
             </a:fld>
             <a:endParaRPr lang="en-US"/>
           </a:p>
@@ -1887,7 +1887,7 @@
           <a:p>
             <a:fld id="{5BCAD085-E8A6-8845-BD4E-CB4CCA059FC4}" type="datetimeFigureOut">
               <a:rPr lang="en-US" smtClean="0"/>
-              <a:t>9/29/2025</a:t>
+              <a:t>9/30/2025</a:t>
             </a:fld>
             <a:endParaRPr lang="en-US"/>
           </a:p>
@@ -2036,7 +2036,7 @@
           <a:p>
             <a:fld id="{5BCAD085-E8A6-8845-BD4E-CB4CCA059FC4}" type="datetimeFigureOut">
               <a:rPr lang="en-US" smtClean="0"/>
-              <a:t>9/29/2025</a:t>
+              <a:t>9/30/2025</a:t>
             </a:fld>
             <a:endParaRPr lang="en-US"/>
           </a:p>
@@ -2131,7 +2131,7 @@
           <a:p>
             <a:fld id="{5BCAD085-E8A6-8845-BD4E-CB4CCA059FC4}" type="datetimeFigureOut">
               <a:rPr lang="en-US" smtClean="0"/>
-              <a:t>9/29/2025</a:t>
+              <a:t>9/30/2025</a:t>
             </a:fld>
             <a:endParaRPr lang="en-US"/>
           </a:p>
@@ -2384,7 +2384,7 @@
           <a:p>
             <a:fld id="{5BCAD085-E8A6-8845-BD4E-CB4CCA059FC4}" type="datetimeFigureOut">
               <a:rPr lang="en-US" smtClean="0"/>
-              <a:t>9/29/2025</a:t>
+              <a:t>9/30/2025</a:t>
             </a:fld>
             <a:endParaRPr lang="en-US"/>
           </a:p>
@@ -2829,7 +2829,7 @@
           <a:p>
             <a:fld id="{5BCAD085-E8A6-8845-BD4E-CB4CCA059FC4}" type="datetimeFigureOut">
               <a:rPr lang="en-US" smtClean="0"/>
-              <a:t>9/29/2025</a:t>
+              <a:t>9/30/2025</a:t>
             </a:fld>
             <a:endParaRPr lang="en-US"/>
           </a:p>
@@ -3193,7 +3193,7 @@
           <a:p>
             <a:fld id="{5BCAD085-E8A6-8845-BD4E-CB4CCA059FC4}" type="datetimeFigureOut">
               <a:rPr lang="en-US" smtClean="0"/>
-              <a:t>9/29/2025</a:t>
+              <a:t>9/30/2025</a:t>
             </a:fld>
             <a:endParaRPr lang="en-US"/>
           </a:p>
@@ -3909,7 +3909,15 @@
                   <a:srgbClr val="FF0000"/>
                 </a:solidFill>
               </a:rPr>
-              <a:t> all!</a:t>
+              <a:t> all! Interact </a:t>
+            </a:r>
+            <a:r>
+              <a:rPr lang="en-US">
+                <a:solidFill>
+                  <a:srgbClr val="FF0000"/>
+                </a:solidFill>
+              </a:rPr>
+              <a:t>with objects on the map to find them!</a:t>
             </a:r>
             <a:endParaRPr dirty="0">
               <a:solidFill>

</xml_diff>

<commit_message>
Deploying to gh-pages from master @ 7c02a944fcc9988c58e71346b509bc3aed1808c9 🚀
</commit_message>
<xml_diff>
--- a/websitepopup/Phishing.pptx
+++ b/websitepopup/Phishing.pptx
@@ -7,9 +7,12 @@
   <p:sldIdLst>
     <p:sldId id="256" r:id="rId2"/>
     <p:sldId id="257" r:id="rId3"/>
-    <p:sldId id="258" r:id="rId4"/>
-    <p:sldId id="259" r:id="rId5"/>
-    <p:sldId id="260" r:id="rId6"/>
+    <p:sldId id="263" r:id="rId4"/>
+    <p:sldId id="258" r:id="rId5"/>
+    <p:sldId id="259" r:id="rId6"/>
+    <p:sldId id="261" r:id="rId7"/>
+    <p:sldId id="262" r:id="rId8"/>
+    <p:sldId id="260" r:id="rId9"/>
   </p:sldIdLst>
   <p:sldSz cx="9144000" cy="6858000" type="screen4x3"/>
   <p:notesSz cx="6858000" cy="9144000"/>
@@ -266,7 +269,7 @@
           <a:p>
             <a:fld id="{5BCAD085-E8A6-8845-BD4E-CB4CCA059FC4}" type="datetimeFigureOut">
               <a:rPr lang="en-US" smtClean="0"/>
-              <a:t>9/30/2025</a:t>
+              <a:t>10/13/2025</a:t>
             </a:fld>
             <a:endParaRPr lang="en-US"/>
           </a:p>
@@ -508,7 +511,7 @@
           <a:p>
             <a:fld id="{5BCAD085-E8A6-8845-BD4E-CB4CCA059FC4}" type="datetimeFigureOut">
               <a:rPr lang="en-US" smtClean="0"/>
-              <a:t>9/30/2025</a:t>
+              <a:t>10/13/2025</a:t>
             </a:fld>
             <a:endParaRPr lang="en-US"/>
           </a:p>
@@ -692,7 +695,7 @@
           <a:p>
             <a:fld id="{5BCAD085-E8A6-8845-BD4E-CB4CCA059FC4}" type="datetimeFigureOut">
               <a:rPr lang="en-US" smtClean="0"/>
-              <a:t>9/30/2025</a:t>
+              <a:t>10/13/2025</a:t>
             </a:fld>
             <a:endParaRPr lang="en-US"/>
           </a:p>
@@ -893,7 +896,7 @@
           <a:p>
             <a:fld id="{5BCAD085-E8A6-8845-BD4E-CB4CCA059FC4}" type="datetimeFigureOut">
               <a:rPr lang="en-US" smtClean="0"/>
-              <a:t>9/30/2025</a:t>
+              <a:t>10/13/2025</a:t>
             </a:fld>
             <a:endParaRPr lang="en-US"/>
           </a:p>
@@ -1172,7 +1175,7 @@
           <a:p>
             <a:fld id="{5BCAD085-E8A6-8845-BD4E-CB4CCA059FC4}" type="datetimeFigureOut">
               <a:rPr lang="en-US" smtClean="0"/>
-              <a:t>9/30/2025</a:t>
+              <a:t>10/13/2025</a:t>
             </a:fld>
             <a:endParaRPr lang="en-US"/>
           </a:p>
@@ -1440,7 +1443,7 @@
           <a:p>
             <a:fld id="{5BCAD085-E8A6-8845-BD4E-CB4CCA059FC4}" type="datetimeFigureOut">
               <a:rPr lang="en-US" smtClean="0"/>
-              <a:t>9/30/2025</a:t>
+              <a:t>10/13/2025</a:t>
             </a:fld>
             <a:endParaRPr lang="en-US"/>
           </a:p>
@@ -1887,7 +1890,7 @@
           <a:p>
             <a:fld id="{5BCAD085-E8A6-8845-BD4E-CB4CCA059FC4}" type="datetimeFigureOut">
               <a:rPr lang="en-US" smtClean="0"/>
-              <a:t>9/30/2025</a:t>
+              <a:t>10/13/2025</a:t>
             </a:fld>
             <a:endParaRPr lang="en-US"/>
           </a:p>
@@ -2036,7 +2039,7 @@
           <a:p>
             <a:fld id="{5BCAD085-E8A6-8845-BD4E-CB4CCA059FC4}" type="datetimeFigureOut">
               <a:rPr lang="en-US" smtClean="0"/>
-              <a:t>9/30/2025</a:t>
+              <a:t>10/13/2025</a:t>
             </a:fld>
             <a:endParaRPr lang="en-US"/>
           </a:p>
@@ -2131,7 +2134,7 @@
           <a:p>
             <a:fld id="{5BCAD085-E8A6-8845-BD4E-CB4CCA059FC4}" type="datetimeFigureOut">
               <a:rPr lang="en-US" smtClean="0"/>
-              <a:t>9/30/2025</a:t>
+              <a:t>10/13/2025</a:t>
             </a:fld>
             <a:endParaRPr lang="en-US"/>
           </a:p>
@@ -2384,7 +2387,7 @@
           <a:p>
             <a:fld id="{5BCAD085-E8A6-8845-BD4E-CB4CCA059FC4}" type="datetimeFigureOut">
               <a:rPr lang="en-US" smtClean="0"/>
-              <a:t>9/30/2025</a:t>
+              <a:t>10/13/2025</a:t>
             </a:fld>
             <a:endParaRPr lang="en-US"/>
           </a:p>
@@ -2829,7 +2832,7 @@
           <a:p>
             <a:fld id="{5BCAD085-E8A6-8845-BD4E-CB4CCA059FC4}" type="datetimeFigureOut">
               <a:rPr lang="en-US" smtClean="0"/>
-              <a:t>9/30/2025</a:t>
+              <a:t>10/13/2025</a:t>
             </a:fld>
             <a:endParaRPr lang="en-US"/>
           </a:p>
@@ -3193,7 +3196,7 @@
           <a:p>
             <a:fld id="{5BCAD085-E8A6-8845-BD4E-CB4CCA059FC4}" type="datetimeFigureOut">
               <a:rPr lang="en-US" smtClean="0"/>
-              <a:t>9/30/2025</a:t>
+              <a:t>10/13/2025</a:t>
             </a:fld>
             <a:endParaRPr lang="en-US"/>
           </a:p>
@@ -3813,7 +3816,13 @@
       </p:grpSpPr>
       <p:sp>
         <p:nvSpPr>
-          <p:cNvPr id="2" name="Title 1"/>
+          <p:cNvPr id="2" name="Title 1">
+            <a:extLst>
+              <a:ext uri="{FF2B5EF4-FFF2-40B4-BE49-F238E27FC236}">
+                <a16:creationId xmlns:a16="http://schemas.microsoft.com/office/drawing/2014/main" id="{4E7F8EE1-7C98-CBBF-C22F-67C7A4F50E55}"/>
+              </a:ext>
+            </a:extLst>
+          </p:cNvPr>
           <p:cNvSpPr>
             <a:spLocks noGrp="1"/>
           </p:cNvSpPr>
@@ -3827,14 +3836,25 @@
           <a:lstStyle/>
           <a:p>
             <a:r>
-              <a:t>Real Examples in Our Game</a:t>
-            </a:r>
-          </a:p>
-        </p:txBody>
-      </p:sp>
-      <p:sp>
-        <p:nvSpPr>
-          <p:cNvPr id="3" name="Content Placeholder 2"/>
+              <a:rPr lang="en-SG" dirty="0" err="1"/>
+              <a:t>Quishing</a:t>
+            </a:r>
+            <a:r>
+              <a:rPr lang="en-SG" dirty="0"/>
+              <a:t> (example)</a:t>
+            </a:r>
+          </a:p>
+        </p:txBody>
+      </p:sp>
+      <p:sp>
+        <p:nvSpPr>
+          <p:cNvPr id="3" name="Content Placeholder 2">
+            <a:extLst>
+              <a:ext uri="{FF2B5EF4-FFF2-40B4-BE49-F238E27FC236}">
+                <a16:creationId xmlns:a16="http://schemas.microsoft.com/office/drawing/2014/main" id="{E7513CF5-4E1A-AC5E-E1F9-707F345EF7FF}"/>
+              </a:ext>
+            </a:extLst>
+          </p:cNvPr>
           <p:cNvSpPr>
             <a:spLocks noGrp="1"/>
           </p:cNvSpPr>
@@ -3842,92 +3862,82 @@
             <p:ph idx="1"/>
           </p:nvPr>
         </p:nvSpPr>
-        <p:spPr/>
-        <p:txBody>
-          <a:bodyPr/>
-          <a:lstStyle/>
-          <a:p>
-            <a:r>
-              <a:rPr dirty="0"/>
-              <a:t>SMS Phishing – 'Click this link to verify your account'</a:t>
-            </a:r>
-          </a:p>
-          <a:p>
-            <a:r>
-              <a:rPr dirty="0"/>
-              <a:t>QR Code Phishing – scan leads to fake login page</a:t>
-            </a:r>
-          </a:p>
-          <a:p>
-            <a:r>
-              <a:rPr dirty="0"/>
-              <a:t>Email Phishing – fake Murdoch University payment notice</a:t>
-            </a:r>
-          </a:p>
+        <p:spPr>
+          <a:xfrm>
+            <a:off x="575094" y="2015733"/>
+            <a:ext cx="8275607" cy="3850229"/>
+          </a:xfrm>
+        </p:spPr>
+        <p:txBody>
+          <a:bodyPr>
+            <a:normAutofit fontScale="92500" lnSpcReduction="10000"/>
+          </a:bodyPr>
+          <a:lstStyle/>
           <a:p>
             <a:pPr marL="0" indent="0">
               <a:buNone/>
             </a:pPr>
-            <a:endParaRPr lang="en-US" dirty="0"/>
+            <a:r>
+              <a:rPr lang="en-SG" dirty="0">
+                <a:hlinkClick r:id="rId2"/>
+              </a:rPr>
+              <a:t>https://www.straitstimes.com/singapore/woman-who-scanned-qr-code-with-malware-lost-20k-to-bubble-tea-survey-scam-while-she-was-sleeping</a:t>
+            </a:r>
+            <a:endParaRPr lang="en-SG" dirty="0"/>
           </a:p>
           <a:p>
             <a:pPr marL="0" indent="0">
               <a:buNone/>
             </a:pPr>
-            <a:r>
-              <a:rPr dirty="0"/>
-              <a:t>(These are the Easter eggs in your Library storyline</a:t>
-            </a:r>
-            <a:r>
-              <a:rPr lang="en-US" dirty="0"/>
-              <a:t>)</a:t>
-            </a:r>
+            <a:endParaRPr lang="en-SG" dirty="0"/>
           </a:p>
           <a:p>
             <a:pPr marL="0" indent="0">
               <a:buNone/>
             </a:pPr>
             <a:r>
-              <a:rPr lang="en-US" dirty="0">
-                <a:solidFill>
-                  <a:srgbClr val="FF0000"/>
-                </a:solidFill>
-              </a:rPr>
-              <a:t>Find ‘</a:t>
-            </a:r>
-            <a:r>
-              <a:rPr lang="en-US" dirty="0" err="1">
-                <a:solidFill>
-                  <a:srgbClr val="FF0000"/>
-                </a:solidFill>
-              </a:rPr>
-              <a:t>em</a:t>
-            </a:r>
-            <a:r>
-              <a:rPr lang="en-US" dirty="0">
-                <a:solidFill>
-                  <a:srgbClr val="FF0000"/>
-                </a:solidFill>
-              </a:rPr>
-              <a:t> all! Interact </a:t>
-            </a:r>
-            <a:r>
-              <a:rPr lang="en-US">
-                <a:solidFill>
-                  <a:srgbClr val="FF0000"/>
-                </a:solidFill>
-              </a:rPr>
-              <a:t>with objects on the map to find them!</a:t>
-            </a:r>
-            <a:endParaRPr dirty="0">
-              <a:solidFill>
-                <a:srgbClr val="FF0000"/>
-              </a:solidFill>
-            </a:endParaRPr>
+              <a:rPr lang="en-SG" b="1" u="sng" dirty="0"/>
+              <a:t>What happened?</a:t>
+            </a:r>
+          </a:p>
+          <a:p>
+            <a:r>
+              <a:rPr lang="en-SG" dirty="0"/>
+              <a:t>Woman scanned a QR code RIGHT OUTSIDE a bubble tea shop promising a free drink</a:t>
+            </a:r>
+          </a:p>
+          <a:p>
+            <a:r>
+              <a:rPr lang="en-SG" dirty="0"/>
+              <a:t>Unknowingly installed malware on her phone</a:t>
+            </a:r>
+          </a:p>
+          <a:p>
+            <a:r>
+              <a:rPr lang="en-SG" dirty="0"/>
+              <a:t>Scammers remotely access her bank app and transferred $20k while she was asleep</a:t>
+            </a:r>
+          </a:p>
+          <a:p>
+            <a:pPr marL="0" indent="0">
+              <a:buNone/>
+            </a:pPr>
+            <a:endParaRPr lang="en-SG" dirty="0"/>
+          </a:p>
+          <a:p>
+            <a:pPr marL="0" indent="0">
+              <a:buNone/>
+            </a:pPr>
+            <a:endParaRPr lang="en-SG" dirty="0"/>
           </a:p>
         </p:txBody>
       </p:sp>
     </p:spTree>
+    <p:extLst>
+      <p:ext uri="{BB962C8B-B14F-4D97-AF65-F5344CB8AC3E}">
+        <p14:creationId xmlns:p14="http://schemas.microsoft.com/office/powerpoint/2010/main" val="2396218166"/>
+      </p:ext>
+    </p:extLst>
   </p:cSld>
   <p:clrMapOvr>
     <a:masterClrMapping/>
@@ -3968,7 +3978,7 @@
           <a:lstStyle/>
           <a:p>
             <a:r>
-              <a:t>How to Spot Phishing</a:t>
+              <a:t>Real Examples in Our Game</a:t>
             </a:r>
           </a:p>
         </p:txBody>
@@ -3989,28 +3999,82 @@
           <a:lstStyle/>
           <a:p>
             <a:r>
-              <a:t>✅ Check sender address and spelling</a:t>
-            </a:r>
-          </a:p>
-          <a:p>
-            <a:r>
-              <a:t>✅ Hover over links before clicking</a:t>
-            </a:r>
-          </a:p>
-          <a:p>
-            <a:r>
-              <a:t>✅ Don’t trust urgent 'Pay Now!' messages</a:t>
-            </a:r>
-          </a:p>
-          <a:p>
-            <a:r>
-              <a:t>✅ Avoid scanning random QR codes</a:t>
-            </a:r>
-          </a:p>
-          <a:p>
-            <a:r>
-              <a:t>✅ Verify with the real source (bank, university, etc.)</a:t>
-            </a:r>
+              <a:rPr dirty="0"/>
+              <a:t>SMS Phishing – 'Click this link to verify your account'</a:t>
+            </a:r>
+          </a:p>
+          <a:p>
+            <a:r>
+              <a:rPr dirty="0"/>
+              <a:t>QR Code Phishing – scan leads to fake login page</a:t>
+            </a:r>
+          </a:p>
+          <a:p>
+            <a:r>
+              <a:rPr dirty="0"/>
+              <a:t>Email Phishing – fake Murdoch University payment notice</a:t>
+            </a:r>
+          </a:p>
+          <a:p>
+            <a:pPr marL="0" indent="0">
+              <a:buNone/>
+            </a:pPr>
+            <a:endParaRPr lang="en-US" dirty="0"/>
+          </a:p>
+          <a:p>
+            <a:pPr marL="0" indent="0">
+              <a:buNone/>
+            </a:pPr>
+            <a:r>
+              <a:rPr dirty="0"/>
+              <a:t>(These are the Easter eggs in your Library storyline</a:t>
+            </a:r>
+            <a:r>
+              <a:rPr lang="en-US" dirty="0"/>
+              <a:t>)</a:t>
+            </a:r>
+          </a:p>
+          <a:p>
+            <a:pPr marL="0" indent="0">
+              <a:buNone/>
+            </a:pPr>
+            <a:r>
+              <a:rPr lang="en-US" dirty="0">
+                <a:solidFill>
+                  <a:srgbClr val="FF0000"/>
+                </a:solidFill>
+              </a:rPr>
+              <a:t>Find ‘</a:t>
+            </a:r>
+            <a:r>
+              <a:rPr lang="en-US" dirty="0" err="1">
+                <a:solidFill>
+                  <a:srgbClr val="FF0000"/>
+                </a:solidFill>
+              </a:rPr>
+              <a:t>em</a:t>
+            </a:r>
+            <a:r>
+              <a:rPr lang="en-US" dirty="0">
+                <a:solidFill>
+                  <a:srgbClr val="FF0000"/>
+                </a:solidFill>
+              </a:rPr>
+              <a:t> all! Interact </a:t>
+            </a:r>
+            <a:r>
+              <a:rPr lang="en-US">
+                <a:solidFill>
+                  <a:srgbClr val="FF0000"/>
+                </a:solidFill>
+              </a:rPr>
+              <a:t>with objects on the map to find them!</a:t>
+            </a:r>
+            <a:endParaRPr dirty="0">
+              <a:solidFill>
+                <a:srgbClr val="FF0000"/>
+              </a:solidFill>
+            </a:endParaRPr>
           </a:p>
         </p:txBody>
       </p:sp>
@@ -4023,6 +4087,354 @@
 </file>
 
 <file path=ppt/slides/slide5.xml><?xml version="1.0" encoding="utf-8"?>
+<p:sld xmlns:a="http://schemas.openxmlformats.org/drawingml/2006/main" xmlns:r="http://schemas.openxmlformats.org/officeDocument/2006/relationships" xmlns:p="http://schemas.openxmlformats.org/presentationml/2006/main">
+  <p:cSld>
+    <p:spTree>
+      <p:nvGrpSpPr>
+        <p:cNvPr id="1" name=""/>
+        <p:cNvGrpSpPr/>
+        <p:nvPr/>
+      </p:nvGrpSpPr>
+      <p:grpSpPr>
+        <a:xfrm>
+          <a:off x="0" y="0"/>
+          <a:ext cx="0" cy="0"/>
+          <a:chOff x="0" y="0"/>
+          <a:chExt cx="0" cy="0"/>
+        </a:xfrm>
+      </p:grpSpPr>
+      <p:sp>
+        <p:nvSpPr>
+          <p:cNvPr id="2" name="Title 1"/>
+          <p:cNvSpPr>
+            <a:spLocks noGrp="1"/>
+          </p:cNvSpPr>
+          <p:nvPr>
+            <p:ph type="title"/>
+          </p:nvPr>
+        </p:nvSpPr>
+        <p:spPr/>
+        <p:txBody>
+          <a:bodyPr/>
+          <a:lstStyle/>
+          <a:p>
+            <a:r>
+              <a:t>How to Spot Phishing</a:t>
+            </a:r>
+          </a:p>
+        </p:txBody>
+      </p:sp>
+      <p:sp>
+        <p:nvSpPr>
+          <p:cNvPr id="3" name="Content Placeholder 2"/>
+          <p:cNvSpPr>
+            <a:spLocks noGrp="1"/>
+          </p:cNvSpPr>
+          <p:nvPr>
+            <p:ph idx="1"/>
+          </p:nvPr>
+        </p:nvSpPr>
+        <p:spPr/>
+        <p:txBody>
+          <a:bodyPr/>
+          <a:lstStyle/>
+          <a:p>
+            <a:r>
+              <a:rPr dirty="0"/>
+              <a:t>✅ Check sender address and spelling</a:t>
+            </a:r>
+          </a:p>
+          <a:p>
+            <a:r>
+              <a:rPr dirty="0"/>
+              <a:t>✅ Hover over links before clicking</a:t>
+            </a:r>
+          </a:p>
+          <a:p>
+            <a:r>
+              <a:rPr dirty="0"/>
+              <a:t>✅ Don’t trust urgent 'Pay Now!' messages</a:t>
+            </a:r>
+          </a:p>
+          <a:p>
+            <a:r>
+              <a:rPr dirty="0"/>
+              <a:t>✅ Avoid scanning random QR codes</a:t>
+            </a:r>
+          </a:p>
+          <a:p>
+            <a:r>
+              <a:rPr dirty="0"/>
+              <a:t>✅ Verify with the real source (bank, university, etc.)</a:t>
+            </a:r>
+            <a:endParaRPr lang="en-US" dirty="0"/>
+          </a:p>
+          <a:p>
+            <a:endParaRPr lang="en-SG" dirty="0"/>
+          </a:p>
+          <a:p>
+            <a:pPr marL="0" indent="0">
+              <a:buNone/>
+            </a:pPr>
+            <a:r>
+              <a:rPr lang="en-US" dirty="0"/>
+              <a:t>See the next couple of slides for examples.</a:t>
+            </a:r>
+            <a:endParaRPr dirty="0"/>
+          </a:p>
+        </p:txBody>
+      </p:sp>
+    </p:spTree>
+  </p:cSld>
+  <p:clrMapOvr>
+    <a:masterClrMapping/>
+  </p:clrMapOvr>
+</p:sld>
+</file>
+
+<file path=ppt/slides/slide6.xml><?xml version="1.0" encoding="utf-8"?>
+<p:sld xmlns:a="http://schemas.openxmlformats.org/drawingml/2006/main" xmlns:r="http://schemas.openxmlformats.org/officeDocument/2006/relationships" xmlns:p="http://schemas.openxmlformats.org/presentationml/2006/main">
+  <p:cSld>
+    <p:spTree>
+      <p:nvGrpSpPr>
+        <p:cNvPr id="1" name=""/>
+        <p:cNvGrpSpPr/>
+        <p:nvPr/>
+      </p:nvGrpSpPr>
+      <p:grpSpPr>
+        <a:xfrm>
+          <a:off x="0" y="0"/>
+          <a:ext cx="0" cy="0"/>
+          <a:chOff x="0" y="0"/>
+          <a:chExt cx="0" cy="0"/>
+        </a:xfrm>
+      </p:grpSpPr>
+      <p:sp>
+        <p:nvSpPr>
+          <p:cNvPr id="3" name="Content Placeholder 2">
+            <a:extLst>
+              <a:ext uri="{FF2B5EF4-FFF2-40B4-BE49-F238E27FC236}">
+                <a16:creationId xmlns:a16="http://schemas.microsoft.com/office/drawing/2014/main" id="{D1C65BE3-CC2A-8919-0798-4796ABB18EBC}"/>
+              </a:ext>
+            </a:extLst>
+          </p:cNvPr>
+          <p:cNvSpPr>
+            <a:spLocks noGrp="1"/>
+          </p:cNvSpPr>
+          <p:nvPr>
+            <p:ph idx="1"/>
+          </p:nvPr>
+        </p:nvSpPr>
+        <p:spPr>
+          <a:xfrm>
+            <a:off x="218537" y="4290204"/>
+            <a:ext cx="8710698" cy="1526949"/>
+          </a:xfrm>
+        </p:spPr>
+        <p:txBody>
+          <a:bodyPr>
+            <a:normAutofit fontScale="85000" lnSpcReduction="20000"/>
+          </a:bodyPr>
+          <a:lstStyle/>
+          <a:p>
+            <a:pPr marL="0" indent="0">
+              <a:buNone/>
+            </a:pPr>
+            <a:r>
+              <a:rPr lang="en-US" dirty="0"/>
+              <a:t>This email uses promise of wealth and requests for trust to gain cooperation from victims.</a:t>
+            </a:r>
+          </a:p>
+          <a:p>
+            <a:r>
+              <a:rPr lang="en-US" dirty="0"/>
+              <a:t>Always look out for suspicious sender address (</a:t>
+            </a:r>
+            <a:r>
+              <a:rPr lang="en-US" dirty="0">
+                <a:hlinkClick r:id="rId2"/>
+              </a:rPr>
+              <a:t>test@zygousa.com</a:t>
+            </a:r>
+            <a:r>
+              <a:rPr lang="en-US" dirty="0"/>
+              <a:t>)</a:t>
+            </a:r>
+          </a:p>
+          <a:p>
+            <a:r>
+              <a:rPr lang="en-US" dirty="0"/>
+              <a:t>Unrealistic money offers</a:t>
+            </a:r>
+          </a:p>
+          <a:p>
+            <a:r>
+              <a:rPr lang="en-US" dirty="0"/>
+              <a:t>Requests to reply to a different email</a:t>
+            </a:r>
+            <a:endParaRPr lang="en-SG" dirty="0"/>
+          </a:p>
+        </p:txBody>
+      </p:sp>
+      <p:pic>
+        <p:nvPicPr>
+          <p:cNvPr id="7" name="Picture 6">
+            <a:extLst>
+              <a:ext uri="{FF2B5EF4-FFF2-40B4-BE49-F238E27FC236}">
+                <a16:creationId xmlns:a16="http://schemas.microsoft.com/office/drawing/2014/main" id="{500D5961-1015-1C2F-446C-849FE08F75A1}"/>
+              </a:ext>
+            </a:extLst>
+          </p:cNvPr>
+          <p:cNvPicPr>
+            <a:picLocks noChangeAspect="1"/>
+          </p:cNvPicPr>
+          <p:nvPr/>
+        </p:nvPicPr>
+        <p:blipFill>
+          <a:blip r:embed="rId3"/>
+          <a:stretch>
+            <a:fillRect/>
+          </a:stretch>
+        </p:blipFill>
+        <p:spPr>
+          <a:xfrm>
+            <a:off x="19016" y="0"/>
+            <a:ext cx="9105967" cy="4094672"/>
+          </a:xfrm>
+          <a:prstGeom prst="rect">
+            <a:avLst/>
+          </a:prstGeom>
+        </p:spPr>
+      </p:pic>
+    </p:spTree>
+    <p:extLst>
+      <p:ext uri="{BB962C8B-B14F-4D97-AF65-F5344CB8AC3E}">
+        <p14:creationId xmlns:p14="http://schemas.microsoft.com/office/powerpoint/2010/main" val="456109597"/>
+      </p:ext>
+    </p:extLst>
+  </p:cSld>
+  <p:clrMapOvr>
+    <a:masterClrMapping/>
+  </p:clrMapOvr>
+</p:sld>
+</file>
+
+<file path=ppt/slides/slide7.xml><?xml version="1.0" encoding="utf-8"?>
+<p:sld xmlns:a="http://schemas.openxmlformats.org/drawingml/2006/main" xmlns:r="http://schemas.openxmlformats.org/officeDocument/2006/relationships" xmlns:p="http://schemas.openxmlformats.org/presentationml/2006/main">
+  <p:cSld>
+    <p:spTree>
+      <p:nvGrpSpPr>
+        <p:cNvPr id="1" name=""/>
+        <p:cNvGrpSpPr/>
+        <p:nvPr/>
+      </p:nvGrpSpPr>
+      <p:grpSpPr>
+        <a:xfrm>
+          <a:off x="0" y="0"/>
+          <a:ext cx="0" cy="0"/>
+          <a:chOff x="0" y="0"/>
+          <a:chExt cx="0" cy="0"/>
+        </a:xfrm>
+      </p:grpSpPr>
+      <p:sp>
+        <p:nvSpPr>
+          <p:cNvPr id="3" name="Content Placeholder 2">
+            <a:extLst>
+              <a:ext uri="{FF2B5EF4-FFF2-40B4-BE49-F238E27FC236}">
+                <a16:creationId xmlns:a16="http://schemas.microsoft.com/office/drawing/2014/main" id="{8C90A37D-3C7C-9030-4D36-C9581E8233C3}"/>
+              </a:ext>
+            </a:extLst>
+          </p:cNvPr>
+          <p:cNvSpPr>
+            <a:spLocks noGrp="1"/>
+          </p:cNvSpPr>
+          <p:nvPr>
+            <p:ph idx="1"/>
+          </p:nvPr>
+        </p:nvSpPr>
+        <p:spPr>
+          <a:xfrm>
+            <a:off x="155275" y="4399472"/>
+            <a:ext cx="8816197" cy="1587259"/>
+          </a:xfrm>
+        </p:spPr>
+        <p:txBody>
+          <a:bodyPr>
+            <a:normAutofit fontScale="92500" lnSpcReduction="20000"/>
+          </a:bodyPr>
+          <a:lstStyle/>
+          <a:p>
+            <a:pPr marL="0" indent="0">
+              <a:buNone/>
+            </a:pPr>
+            <a:r>
+              <a:rPr lang="en-US" dirty="0"/>
+              <a:t>This email uses fear and urgency to trick victims, pretends to be from a trusted company and warning </a:t>
+            </a:r>
+            <a:r>
+              <a:rPr lang="en-US"/>
+              <a:t>about “exposed credentials”.</a:t>
+            </a:r>
+            <a:endParaRPr lang="en-US" dirty="0"/>
+          </a:p>
+          <a:p>
+            <a:r>
+              <a:rPr lang="en-SG" dirty="0"/>
+              <a:t>Never open attachments in email</a:t>
+            </a:r>
+          </a:p>
+          <a:p>
+            <a:r>
+              <a:rPr lang="en-SG" dirty="0"/>
+              <a:t>Never click through emails links, always check the official website directly!</a:t>
+            </a:r>
+          </a:p>
+        </p:txBody>
+      </p:sp>
+      <p:pic>
+        <p:nvPicPr>
+          <p:cNvPr id="5" name="Picture 4">
+            <a:extLst>
+              <a:ext uri="{FF2B5EF4-FFF2-40B4-BE49-F238E27FC236}">
+                <a16:creationId xmlns:a16="http://schemas.microsoft.com/office/drawing/2014/main" id="{CC1EE258-5D62-9EC7-1F15-EA0B4805DCF8}"/>
+              </a:ext>
+            </a:extLst>
+          </p:cNvPr>
+          <p:cNvPicPr>
+            <a:picLocks noChangeAspect="1"/>
+          </p:cNvPicPr>
+          <p:nvPr/>
+        </p:nvPicPr>
+        <p:blipFill>
+          <a:blip r:embed="rId2"/>
+          <a:stretch>
+            <a:fillRect/>
+          </a:stretch>
+        </p:blipFill>
+        <p:spPr>
+          <a:xfrm>
+            <a:off x="0" y="-63424"/>
+            <a:ext cx="9144000" cy="4370882"/>
+          </a:xfrm>
+          <a:prstGeom prst="rect">
+            <a:avLst/>
+          </a:prstGeom>
+        </p:spPr>
+      </p:pic>
+    </p:spTree>
+    <p:extLst>
+      <p:ext uri="{BB962C8B-B14F-4D97-AF65-F5344CB8AC3E}">
+        <p14:creationId xmlns:p14="http://schemas.microsoft.com/office/powerpoint/2010/main" val="3677187619"/>
+      </p:ext>
+    </p:extLst>
+  </p:cSld>
+  <p:clrMapOvr>
+    <a:masterClrMapping/>
+  </p:clrMapOvr>
+</p:sld>
+</file>
+
+<file path=ppt/slides/slide8.xml><?xml version="1.0" encoding="utf-8"?>
 <p:sld xmlns:a="http://schemas.openxmlformats.org/drawingml/2006/main" xmlns:r="http://schemas.openxmlformats.org/officeDocument/2006/relationships" xmlns:p="http://schemas.openxmlformats.org/presentationml/2006/main">
   <p:cSld>
     <p:spTree>

</xml_diff>

<commit_message>
Deploying to gh-pages from master @ 61c34b4cb7f9607334d950a7e0b5540d0c570b2b 🚀
</commit_message>
<xml_diff>
--- a/websitepopup/Phishing.pptx
+++ b/websitepopup/Phishing.pptx
@@ -3864,13 +3864,13 @@
         </p:nvSpPr>
         <p:spPr>
           <a:xfrm>
-            <a:off x="575094" y="2015733"/>
-            <a:ext cx="8275607" cy="3850229"/>
+            <a:off x="575094" y="1853755"/>
+            <a:ext cx="8275607" cy="4012207"/>
           </a:xfrm>
         </p:spPr>
         <p:txBody>
           <a:bodyPr>
-            <a:normAutofit fontScale="92500" lnSpcReduction="10000"/>
+            <a:normAutofit fontScale="85000" lnSpcReduction="10000"/>
           </a:bodyPr>
           <a:lstStyle/>
           <a:p>
@@ -3895,6 +3895,18 @@
             <a:pPr marL="0" indent="0">
               <a:buNone/>
             </a:pPr>
+            <a:endParaRPr lang="en-SG" dirty="0"/>
+          </a:p>
+          <a:p>
+            <a:pPr marL="0" indent="0">
+              <a:buNone/>
+            </a:pPr>
+            <a:endParaRPr lang="en-SG" dirty="0"/>
+          </a:p>
+          <a:p>
+            <a:pPr marL="0" indent="0">
+              <a:buNone/>
+            </a:pPr>
             <a:r>
               <a:rPr lang="en-SG" b="1" u="sng" dirty="0"/>
               <a:t>What happened?</a:t>
@@ -3932,6 +3944,36 @@
           </a:p>
         </p:txBody>
       </p:sp>
+      <p:pic>
+        <p:nvPicPr>
+          <p:cNvPr id="5" name="Picture 4">
+            <a:extLst>
+              <a:ext uri="{FF2B5EF4-FFF2-40B4-BE49-F238E27FC236}">
+                <a16:creationId xmlns:a16="http://schemas.microsoft.com/office/drawing/2014/main" id="{EA8A60D0-7E24-561B-B158-87ED8D33F387}"/>
+              </a:ext>
+            </a:extLst>
+          </p:cNvPr>
+          <p:cNvPicPr>
+            <a:picLocks noChangeAspect="1"/>
+          </p:cNvPicPr>
+          <p:nvPr/>
+        </p:nvPicPr>
+        <p:blipFill>
+          <a:blip r:embed="rId3"/>
+          <a:stretch>
+            <a:fillRect/>
+          </a:stretch>
+        </p:blipFill>
+        <p:spPr>
+          <a:xfrm>
+            <a:off x="1012166" y="2755958"/>
+            <a:ext cx="7131169" cy="757868"/>
+          </a:xfrm>
+          <a:prstGeom prst="rect">
+            <a:avLst/>
+          </a:prstGeom>
+        </p:spPr>
+      </p:pic>
     </p:spTree>
     <p:extLst>
       <p:ext uri="{BB962C8B-B14F-4D97-AF65-F5344CB8AC3E}">

</xml_diff>

<commit_message>
Deploying to gh-pages from master @ 0efdc88f7f954b825da0c7e3a5cfcf25e8034f7a 🚀
</commit_message>
<xml_diff>
--- a/websitepopup/Phishing.pptx
+++ b/websitepopup/Phishing.pptx
@@ -12,7 +12,8 @@
     <p:sldId id="259" r:id="rId6"/>
     <p:sldId id="261" r:id="rId7"/>
     <p:sldId id="262" r:id="rId8"/>
-    <p:sldId id="260" r:id="rId9"/>
+    <p:sldId id="264" r:id="rId9"/>
+    <p:sldId id="260" r:id="rId10"/>
   </p:sldIdLst>
   <p:sldSz cx="9144000" cy="6858000" type="screen4x3"/>
   <p:notesSz cx="6858000" cy="9144000"/>
@@ -269,7 +270,7 @@
           <a:p>
             <a:fld id="{5BCAD085-E8A6-8845-BD4E-CB4CCA059FC4}" type="datetimeFigureOut">
               <a:rPr lang="en-US" smtClean="0"/>
-              <a:t>10/13/2025</a:t>
+              <a:t>10/20/2025</a:t>
             </a:fld>
             <a:endParaRPr lang="en-US"/>
           </a:p>
@@ -511,7 +512,7 @@
           <a:p>
             <a:fld id="{5BCAD085-E8A6-8845-BD4E-CB4CCA059FC4}" type="datetimeFigureOut">
               <a:rPr lang="en-US" smtClean="0"/>
-              <a:t>10/13/2025</a:t>
+              <a:t>10/20/2025</a:t>
             </a:fld>
             <a:endParaRPr lang="en-US"/>
           </a:p>
@@ -695,7 +696,7 @@
           <a:p>
             <a:fld id="{5BCAD085-E8A6-8845-BD4E-CB4CCA059FC4}" type="datetimeFigureOut">
               <a:rPr lang="en-US" smtClean="0"/>
-              <a:t>10/13/2025</a:t>
+              <a:t>10/20/2025</a:t>
             </a:fld>
             <a:endParaRPr lang="en-US"/>
           </a:p>
@@ -896,7 +897,7 @@
           <a:p>
             <a:fld id="{5BCAD085-E8A6-8845-BD4E-CB4CCA059FC4}" type="datetimeFigureOut">
               <a:rPr lang="en-US" smtClean="0"/>
-              <a:t>10/13/2025</a:t>
+              <a:t>10/20/2025</a:t>
             </a:fld>
             <a:endParaRPr lang="en-US"/>
           </a:p>
@@ -1175,7 +1176,7 @@
           <a:p>
             <a:fld id="{5BCAD085-E8A6-8845-BD4E-CB4CCA059FC4}" type="datetimeFigureOut">
               <a:rPr lang="en-US" smtClean="0"/>
-              <a:t>10/13/2025</a:t>
+              <a:t>10/20/2025</a:t>
             </a:fld>
             <a:endParaRPr lang="en-US"/>
           </a:p>
@@ -1443,7 +1444,7 @@
           <a:p>
             <a:fld id="{5BCAD085-E8A6-8845-BD4E-CB4CCA059FC4}" type="datetimeFigureOut">
               <a:rPr lang="en-US" smtClean="0"/>
-              <a:t>10/13/2025</a:t>
+              <a:t>10/20/2025</a:t>
             </a:fld>
             <a:endParaRPr lang="en-US"/>
           </a:p>
@@ -1890,7 +1891,7 @@
           <a:p>
             <a:fld id="{5BCAD085-E8A6-8845-BD4E-CB4CCA059FC4}" type="datetimeFigureOut">
               <a:rPr lang="en-US" smtClean="0"/>
-              <a:t>10/13/2025</a:t>
+              <a:t>10/20/2025</a:t>
             </a:fld>
             <a:endParaRPr lang="en-US"/>
           </a:p>
@@ -2039,7 +2040,7 @@
           <a:p>
             <a:fld id="{5BCAD085-E8A6-8845-BD4E-CB4CCA059FC4}" type="datetimeFigureOut">
               <a:rPr lang="en-US" smtClean="0"/>
-              <a:t>10/13/2025</a:t>
+              <a:t>10/20/2025</a:t>
             </a:fld>
             <a:endParaRPr lang="en-US"/>
           </a:p>
@@ -2134,7 +2135,7 @@
           <a:p>
             <a:fld id="{5BCAD085-E8A6-8845-BD4E-CB4CCA059FC4}" type="datetimeFigureOut">
               <a:rPr lang="en-US" smtClean="0"/>
-              <a:t>10/13/2025</a:t>
+              <a:t>10/20/2025</a:t>
             </a:fld>
             <a:endParaRPr lang="en-US"/>
           </a:p>
@@ -2387,7 +2388,7 @@
           <a:p>
             <a:fld id="{5BCAD085-E8A6-8845-BD4E-CB4CCA059FC4}" type="datetimeFigureOut">
               <a:rPr lang="en-US" smtClean="0"/>
-              <a:t>10/13/2025</a:t>
+              <a:t>10/20/2025</a:t>
             </a:fld>
             <a:endParaRPr lang="en-US"/>
           </a:p>
@@ -2832,7 +2833,7 @@
           <a:p>
             <a:fld id="{5BCAD085-E8A6-8845-BD4E-CB4CCA059FC4}" type="datetimeFigureOut">
               <a:rPr lang="en-US" smtClean="0"/>
-              <a:t>10/13/2025</a:t>
+              <a:t>10/20/2025</a:t>
             </a:fld>
             <a:endParaRPr lang="en-US"/>
           </a:p>
@@ -2999,6 +3000,13 @@
             <a:schemeClr val="lt1"/>
           </a:fontRef>
         </p:style>
+        <p:txBody>
+          <a:bodyPr/>
+          <a:lstStyle/>
+          <a:p>
+            <a:endParaRPr lang="en-SG"/>
+          </a:p>
+        </p:txBody>
       </p:sp>
       <p:pic>
         <p:nvPicPr>
@@ -3196,7 +3204,7 @@
           <a:p>
             <a:fld id="{5BCAD085-E8A6-8845-BD4E-CB4CCA059FC4}" type="datetimeFigureOut">
               <a:rPr lang="en-US" smtClean="0"/>
-              <a:t>10/13/2025</a:t>
+              <a:t>10/20/2025</a:t>
             </a:fld>
             <a:endParaRPr lang="en-US"/>
           </a:p>
@@ -4495,6 +4503,119 @@
       </p:grpSpPr>
       <p:sp>
         <p:nvSpPr>
+          <p:cNvPr id="3" name="Content Placeholder 2">
+            <a:extLst>
+              <a:ext uri="{FF2B5EF4-FFF2-40B4-BE49-F238E27FC236}">
+                <a16:creationId xmlns:a16="http://schemas.microsoft.com/office/drawing/2014/main" id="{4813132F-02C6-AA97-D986-35336B27B077}"/>
+              </a:ext>
+            </a:extLst>
+          </p:cNvPr>
+          <p:cNvSpPr>
+            <a:spLocks noGrp="1"/>
+          </p:cNvSpPr>
+          <p:nvPr>
+            <p:ph idx="1"/>
+          </p:nvPr>
+        </p:nvSpPr>
+        <p:spPr>
+          <a:xfrm>
+            <a:off x="143774" y="4813539"/>
+            <a:ext cx="8925464" cy="1155940"/>
+          </a:xfrm>
+        </p:spPr>
+        <p:txBody>
+          <a:bodyPr>
+            <a:normAutofit fontScale="85000" lnSpcReduction="10000"/>
+          </a:bodyPr>
+          <a:lstStyle/>
+          <a:p>
+            <a:pPr marL="0" indent="0">
+              <a:buNone/>
+            </a:pPr>
+            <a:r>
+              <a:rPr lang="en-US" dirty="0"/>
+              <a:t>This fake WhatsApp message uses urgency and fear to trick users into clicking a spoofed link (</a:t>
+            </a:r>
+            <a:r>
+              <a:rPr lang="en-US" dirty="0" err="1"/>
+              <a:t>whatasapp.top</a:t>
+            </a:r>
+            <a:r>
+              <a:rPr lang="en-US" dirty="0"/>
+              <a:t>). The sender’s name is fake and real WhatsApp never asks for verification via links. </a:t>
+            </a:r>
+          </a:p>
+          <a:p>
+            <a:r>
+              <a:rPr lang="en-US" dirty="0"/>
+              <a:t>Always verify only in the official app</a:t>
+            </a:r>
+            <a:endParaRPr lang="en-SG" dirty="0"/>
+          </a:p>
+        </p:txBody>
+      </p:sp>
+      <p:pic>
+        <p:nvPicPr>
+          <p:cNvPr id="5" name="Picture 4">
+            <a:extLst>
+              <a:ext uri="{FF2B5EF4-FFF2-40B4-BE49-F238E27FC236}">
+                <a16:creationId xmlns:a16="http://schemas.microsoft.com/office/drawing/2014/main" id="{D2F15ADD-344F-0FCD-A98E-F361A3B2E423}"/>
+              </a:ext>
+            </a:extLst>
+          </p:cNvPr>
+          <p:cNvPicPr>
+            <a:picLocks noChangeAspect="1"/>
+          </p:cNvPicPr>
+          <p:nvPr/>
+        </p:nvPicPr>
+        <p:blipFill>
+          <a:blip r:embed="rId2"/>
+          <a:stretch>
+            <a:fillRect/>
+          </a:stretch>
+        </p:blipFill>
+        <p:spPr>
+          <a:xfrm>
+            <a:off x="1403231" y="132272"/>
+            <a:ext cx="6659592" cy="4681267"/>
+          </a:xfrm>
+          <a:prstGeom prst="rect">
+            <a:avLst/>
+          </a:prstGeom>
+        </p:spPr>
+      </p:pic>
+    </p:spTree>
+    <p:extLst>
+      <p:ext uri="{BB962C8B-B14F-4D97-AF65-F5344CB8AC3E}">
+        <p14:creationId xmlns:p14="http://schemas.microsoft.com/office/powerpoint/2010/main" val="2473157699"/>
+      </p:ext>
+    </p:extLst>
+  </p:cSld>
+  <p:clrMapOvr>
+    <a:masterClrMapping/>
+  </p:clrMapOvr>
+</p:sld>
+</file>
+
+<file path=ppt/slides/slide9.xml><?xml version="1.0" encoding="utf-8"?>
+<p:sld xmlns:a="http://schemas.openxmlformats.org/drawingml/2006/main" xmlns:r="http://schemas.openxmlformats.org/officeDocument/2006/relationships" xmlns:p="http://schemas.openxmlformats.org/presentationml/2006/main">
+  <p:cSld>
+    <p:spTree>
+      <p:nvGrpSpPr>
+        <p:cNvPr id="1" name=""/>
+        <p:cNvGrpSpPr/>
+        <p:nvPr/>
+      </p:nvGrpSpPr>
+      <p:grpSpPr>
+        <a:xfrm>
+          <a:off x="0" y="0"/>
+          <a:ext cx="0" cy="0"/>
+          <a:chOff x="0" y="0"/>
+          <a:chExt cx="0" cy="0"/>
+        </a:xfrm>
+      </p:grpSpPr>
+      <p:sp>
+        <p:nvSpPr>
           <p:cNvPr id="2" name="Title 1"/>
           <p:cNvSpPr>
             <a:spLocks noGrp="1"/>

</xml_diff>